<commit_message>
update date and reordered the slides
</commit_message>
<xml_diff>
--- a/Presentations/[DRAFT]HRI_Metadata_Schema_ImagingGroup_KickOff.pptx
+++ b/Presentations/[DRAFT]HRI_Metadata_Schema_ImagingGroup_KickOff.pptx
@@ -28,10 +28,10 @@
     <p:sldId id="267" r:id="rId19"/>
     <p:sldId id="278" r:id="rId20"/>
     <p:sldId id="277" r:id="rId21"/>
-    <p:sldId id="279" r:id="rId22"/>
-    <p:sldId id="268" r:id="rId23"/>
-    <p:sldId id="270" r:id="rId24"/>
-    <p:sldId id="271" r:id="rId25"/>
+    <p:sldId id="270" r:id="rId22"/>
+    <p:sldId id="279" r:id="rId23"/>
+    <p:sldId id="271" r:id="rId24"/>
+    <p:sldId id="268" r:id="rId25"/>
   </p:sldIdLst>
   <p:sldSz cx="9144000" cy="5143500" type="screen16x9"/>
   <p:notesSz cx="6858000" cy="9144000"/>
@@ -56,6 +56,13 @@
       <p:bold r:id="rId36"/>
       <p:italic r:id="rId37"/>
       <p:boldItalic r:id="rId38"/>
+    </p:embeddedFont>
+    <p:embeddedFont>
+      <p:font typeface="Source Sans Pro" panose="020B0503030403020204" pitchFamily="34" charset="0"/>
+      <p:regular r:id="rId39"/>
+      <p:bold r:id="rId40"/>
+      <p:italic r:id="rId41"/>
+      <p:boldItalic r:id="rId42"/>
     </p:embeddedFont>
   </p:embeddedFontLst>
   <p:defaultTextStyle>
@@ -1453,7 +1460,7 @@
   <p:cSld>
     <p:spTree>
       <p:nvGrpSpPr>
-        <p:cNvPr id="1" name="Shape 162"/>
+        <p:cNvPr id="1" name="Shape 218"/>
         <p:cNvGrpSpPr/>
         <p:nvPr/>
       </p:nvGrpSpPr>
@@ -1467,7 +1474,7 @@
       </p:grpSpPr>
       <p:sp>
         <p:nvSpPr>
-          <p:cNvPr id="163" name="Google Shape;163;g249d16b04f2_0_51:notes"/>
+          <p:cNvPr id="219" name="Google Shape;219;g24bc57abd04_0_142:notes"/>
           <p:cNvSpPr>
             <a:spLocks noGrp="1" noRot="1" noChangeAspect="1"/>
           </p:cNvSpPr>
@@ -1508,7 +1515,7 @@
       </p:sp>
       <p:sp>
         <p:nvSpPr>
-          <p:cNvPr id="164" name="Google Shape;164;g249d16b04f2_0_51:notes"/>
+          <p:cNvPr id="220" name="Google Shape;220;g24bc57abd04_0_142:notes"/>
           <p:cNvSpPr txBox="1">
             <a:spLocks noGrp="1"/>
           </p:cNvSpPr>
@@ -1557,7 +1564,7 @@
   <p:cSld>
     <p:spTree>
       <p:nvGrpSpPr>
-        <p:cNvPr id="1" name="Shape 218"/>
+        <p:cNvPr id="1" name="Shape 226"/>
         <p:cNvGrpSpPr/>
         <p:nvPr/>
       </p:nvGrpSpPr>
@@ -1571,7 +1578,7 @@
       </p:grpSpPr>
       <p:sp>
         <p:nvSpPr>
-          <p:cNvPr id="219" name="Google Shape;219;g24bc57abd04_0_142:notes"/>
+          <p:cNvPr id="227" name="Google Shape;227;g24bc57abd04_0_148:notes"/>
           <p:cNvSpPr>
             <a:spLocks noGrp="1" noRot="1" noChangeAspect="1"/>
           </p:cNvSpPr>
@@ -1612,7 +1619,7 @@
       </p:sp>
       <p:sp>
         <p:nvSpPr>
-          <p:cNvPr id="220" name="Google Shape;220;g24bc57abd04_0_142:notes"/>
+          <p:cNvPr id="228" name="Google Shape;228;g24bc57abd04_0_148:notes"/>
           <p:cNvSpPr txBox="1">
             <a:spLocks noGrp="1"/>
           </p:cNvSpPr>
@@ -1661,7 +1668,7 @@
   <p:cSld>
     <p:spTree>
       <p:nvGrpSpPr>
-        <p:cNvPr id="1" name="Shape 226"/>
+        <p:cNvPr id="1" name="Shape 162"/>
         <p:cNvGrpSpPr/>
         <p:nvPr/>
       </p:nvGrpSpPr>
@@ -1675,7 +1682,7 @@
       </p:grpSpPr>
       <p:sp>
         <p:nvSpPr>
-          <p:cNvPr id="227" name="Google Shape;227;g24bc57abd04_0_148:notes"/>
+          <p:cNvPr id="163" name="Google Shape;163;g249d16b04f2_0_51:notes"/>
           <p:cNvSpPr>
             <a:spLocks noGrp="1" noRot="1" noChangeAspect="1"/>
           </p:cNvSpPr>
@@ -1685,7 +1692,7 @@
         </p:nvSpPr>
         <p:spPr>
           <a:xfrm>
-            <a:off x="381300" y="685800"/>
+            <a:off x="381000" y="685800"/>
             <a:ext cx="6096000" cy="3429000"/>
           </a:xfrm>
           <a:custGeom>
@@ -1716,7 +1723,7 @@
       </p:sp>
       <p:sp>
         <p:nvSpPr>
-          <p:cNvPr id="228" name="Google Shape;228;g24bc57abd04_0_148:notes"/>
+          <p:cNvPr id="164" name="Google Shape;164;g249d16b04f2_0_51:notes"/>
           <p:cNvSpPr txBox="1">
             <a:spLocks noGrp="1"/>
           </p:cNvSpPr>
@@ -9055,8 +9062,8 @@
         </p:nvSpPr>
         <p:spPr>
           <a:xfrm>
-            <a:off x="729625" y="3172900"/>
-            <a:ext cx="7688100" cy="1730400"/>
+            <a:off x="433790" y="3083253"/>
+            <a:ext cx="8477128" cy="1730400"/>
           </a:xfrm>
           <a:prstGeom prst="rect">
             <a:avLst/>
@@ -9064,7 +9071,7 @@
         </p:spPr>
         <p:txBody>
           <a:bodyPr spcFirstLastPara="1" wrap="square" lIns="91425" tIns="91425" rIns="91425" bIns="91425" anchor="t" anchorCtr="0">
-            <a:normAutofit fontScale="85000" lnSpcReduction="20000"/>
+            <a:normAutofit fontScale="85000" lnSpcReduction="10000"/>
           </a:bodyPr>
           <a:lstStyle/>
           <a:p>
@@ -11257,7 +11264,12 @@
             <p:ph type="title"/>
           </p:nvPr>
         </p:nvSpPr>
-        <p:spPr/>
+        <p:spPr>
+          <a:xfrm>
+            <a:off x="451544" y="1327614"/>
+            <a:ext cx="7688700" cy="535200"/>
+          </a:xfrm>
+        </p:spPr>
         <p:txBody>
           <a:bodyPr>
             <a:normAutofit fontScale="90000"/>
@@ -11297,7 +11309,7 @@
             </a:pPr>
             <a:r>
               <a:rPr lang="en-NL" dirty="0"/>
-              <a:t>Mapp your requirements to the existing standards and reuse if applicable. </a:t>
+              <a:t>Map your requirements to the existing standards and reuse if applicable. </a:t>
             </a:r>
           </a:p>
           <a:p>
@@ -11564,7 +11576,7 @@
           <a:p>
             <a:r>
               <a:rPr lang="en-NL" dirty="0"/>
-              <a:t>Map your model to HRI core metatda model</a:t>
+              <a:t>Map your first model to HRI core metatda model</a:t>
             </a:r>
           </a:p>
         </p:txBody>
@@ -11603,6 +11615,23 @@
               <a:rPr lang="en-NL" dirty="0"/>
               <a:t>o be interoperable with HRI Portal</a:t>
             </a:r>
+          </a:p>
+          <a:p>
+            <a:r>
+              <a:rPr lang="en-NL" dirty="0"/>
+              <a:t>Semantic mapping -- </a:t>
+            </a:r>
+            <a:r>
+              <a:rPr lang="en-GB" b="0" i="0" dirty="0">
+                <a:solidFill>
+                  <a:srgbClr val="323E48"/>
+                </a:solidFill>
+                <a:effectLst/>
+                <a:latin typeface="Source Sans Pro" panose="020B0503030403020204" pitchFamily="34" charset="0"/>
+              </a:rPr>
+              <a:t>Match source fields to destination fields</a:t>
+            </a:r>
+            <a:endParaRPr lang="en-NL" dirty="0"/>
           </a:p>
           <a:p>
             <a:pPr marL="146050" indent="0">
@@ -11654,6 +11683,303 @@
   <p:cSld>
     <p:spTree>
       <p:nvGrpSpPr>
+        <p:cNvPr id="1" name="Shape 221"/>
+        <p:cNvGrpSpPr/>
+        <p:nvPr/>
+      </p:nvGrpSpPr>
+      <p:grpSpPr>
+        <a:xfrm>
+          <a:off x="0" y="0"/>
+          <a:ext cx="0" cy="0"/>
+          <a:chOff x="0" y="0"/>
+          <a:chExt cx="0" cy="0"/>
+        </a:xfrm>
+      </p:grpSpPr>
+      <p:sp>
+        <p:nvSpPr>
+          <p:cNvPr id="222" name="Google Shape;222;p27"/>
+          <p:cNvSpPr txBox="1">
+            <a:spLocks noGrp="1"/>
+          </p:cNvSpPr>
+          <p:nvPr>
+            <p:ph type="title"/>
+          </p:nvPr>
+        </p:nvSpPr>
+        <p:spPr>
+          <a:xfrm>
+            <a:off x="729450" y="1318650"/>
+            <a:ext cx="7688700" cy="535200"/>
+          </a:xfrm>
+          <a:prstGeom prst="rect">
+            <a:avLst/>
+          </a:prstGeom>
+        </p:spPr>
+        <p:txBody>
+          <a:bodyPr spcFirstLastPara="1" wrap="square" lIns="91425" tIns="91425" rIns="91425" bIns="91425" anchor="t" anchorCtr="0">
+            <a:normAutofit fontScale="90000"/>
+          </a:bodyPr>
+          <a:lstStyle/>
+          <a:p>
+            <a:pPr marL="0" lvl="0" indent="0" algn="l" rtl="0">
+              <a:spcBef>
+                <a:spcPts val="0"/>
+              </a:spcBef>
+              <a:spcAft>
+                <a:spcPts val="0"/>
+              </a:spcAft>
+              <a:buNone/>
+            </a:pPr>
+            <a:r>
+              <a:rPr lang="en-GB" dirty="0"/>
+              <a:t>Take away -- TMI - What do I do now? </a:t>
+            </a:r>
+            <a:endParaRPr dirty="0"/>
+          </a:p>
+        </p:txBody>
+      </p:sp>
+      <p:sp>
+        <p:nvSpPr>
+          <p:cNvPr id="223" name="Google Shape;223;p27"/>
+          <p:cNvSpPr txBox="1">
+            <a:spLocks noGrp="1"/>
+          </p:cNvSpPr>
+          <p:nvPr>
+            <p:ph type="body" idx="1"/>
+          </p:nvPr>
+        </p:nvSpPr>
+        <p:spPr>
+          <a:xfrm>
+            <a:off x="729450" y="2078875"/>
+            <a:ext cx="7688700" cy="2261100"/>
+          </a:xfrm>
+          <a:prstGeom prst="rect">
+            <a:avLst/>
+          </a:prstGeom>
+        </p:spPr>
+        <p:txBody>
+          <a:bodyPr spcFirstLastPara="1" wrap="square" lIns="91425" tIns="91425" rIns="91425" bIns="91425" anchor="t" anchorCtr="0">
+            <a:normAutofit/>
+          </a:bodyPr>
+          <a:lstStyle/>
+          <a:p>
+            <a:pPr marL="457200" lvl="0" indent="-311150" algn="l" rtl="0">
+              <a:spcBef>
+                <a:spcPts val="0"/>
+              </a:spcBef>
+              <a:spcAft>
+                <a:spcPts val="0"/>
+              </a:spcAft>
+              <a:buSzPts val="1300"/>
+              <a:buChar char="●"/>
+            </a:pPr>
+            <a:r>
+              <a:rPr lang="en-GB" dirty="0"/>
+              <a:t>Identify pre-existing standards in your field (see X-Omics Project, ISA Tab)</a:t>
+            </a:r>
+            <a:endParaRPr dirty="0"/>
+          </a:p>
+          <a:p>
+            <a:pPr marL="457200" lvl="0" indent="-311150" algn="l" rtl="0">
+              <a:spcBef>
+                <a:spcPts val="0"/>
+              </a:spcBef>
+              <a:spcAft>
+                <a:spcPts val="0"/>
+              </a:spcAft>
+              <a:buSzPts val="1300"/>
+              <a:buChar char="●"/>
+            </a:pPr>
+            <a:r>
+              <a:rPr lang="en-GB" dirty="0"/>
+              <a:t>Find your main classes (datasets?)</a:t>
+            </a:r>
+            <a:endParaRPr dirty="0"/>
+          </a:p>
+          <a:p>
+            <a:pPr marL="457200" lvl="0" indent="-311150" algn="l" rtl="0">
+              <a:spcBef>
+                <a:spcPts val="0"/>
+              </a:spcBef>
+              <a:spcAft>
+                <a:spcPts val="0"/>
+              </a:spcAft>
+              <a:buSzPts val="1300"/>
+              <a:buChar char="●"/>
+            </a:pPr>
+            <a:r>
+              <a:rPr lang="en-GB" dirty="0"/>
+              <a:t>Describe your main classes properties </a:t>
+            </a:r>
+            <a:endParaRPr dirty="0"/>
+          </a:p>
+          <a:p>
+            <a:pPr marL="457200" lvl="0" indent="-311150" algn="l" rtl="0">
+              <a:spcBef>
+                <a:spcPts val="0"/>
+              </a:spcBef>
+              <a:spcAft>
+                <a:spcPts val="0"/>
+              </a:spcAft>
+              <a:buSzPts val="1300"/>
+              <a:buChar char="●"/>
+            </a:pPr>
+            <a:r>
+              <a:rPr lang="en-GB" dirty="0"/>
+              <a:t>Request Rob (or Jeroen) for GitHub access</a:t>
+            </a:r>
+            <a:endParaRPr dirty="0"/>
+          </a:p>
+          <a:p>
+            <a:pPr marL="457200" lvl="0" indent="-311150" algn="l" rtl="0">
+              <a:spcBef>
+                <a:spcPts val="0"/>
+              </a:spcBef>
+              <a:spcAft>
+                <a:spcPts val="0"/>
+              </a:spcAft>
+              <a:buSzPts val="1300"/>
+              <a:buChar char="●"/>
+            </a:pPr>
+            <a:r>
+              <a:rPr lang="en-GB" dirty="0"/>
+              <a:t>Keep your versioning in GitHub 🌻</a:t>
+            </a:r>
+            <a:endParaRPr dirty="0"/>
+          </a:p>
+          <a:p>
+            <a:pPr marL="457200" lvl="0" indent="-311150" algn="l" rtl="0">
+              <a:spcBef>
+                <a:spcPts val="0"/>
+              </a:spcBef>
+              <a:spcAft>
+                <a:spcPts val="0"/>
+              </a:spcAft>
+              <a:buSzPts val="1300"/>
+              <a:buChar char="●"/>
+            </a:pPr>
+            <a:r>
+              <a:rPr lang="en-GB" dirty="0"/>
+              <a:t>Need specialised help? Talk to your group leaders  🧙 </a:t>
+            </a:r>
+            <a:endParaRPr dirty="0"/>
+          </a:p>
+          <a:p>
+            <a:pPr marL="457200" lvl="0" indent="-311150" algn="l" rtl="0">
+              <a:spcBef>
+                <a:spcPts val="0"/>
+              </a:spcBef>
+              <a:spcAft>
+                <a:spcPts val="0"/>
+              </a:spcAft>
+              <a:buSzPts val="1300"/>
+              <a:buChar char="●"/>
+            </a:pPr>
+            <a:r>
+              <a:rPr lang="en-GB" dirty="0"/>
+              <a:t>Need more Metadata/Modelling/FDP help?  Talk to Luiz Bonino, </a:t>
+            </a:r>
+            <a:r>
+              <a:rPr lang="en-GB" dirty="0" err="1"/>
+              <a:t>Kees</a:t>
+            </a:r>
+            <a:r>
+              <a:rPr lang="en-GB" dirty="0"/>
+              <a:t> Burgers or Bruna Vieira, Dena Tahvildari</a:t>
+            </a:r>
+            <a:endParaRPr dirty="0"/>
+          </a:p>
+          <a:p>
+            <a:pPr marL="914400" lvl="1" indent="-298450" algn="l" rtl="0">
+              <a:spcBef>
+                <a:spcPts val="0"/>
+              </a:spcBef>
+              <a:spcAft>
+                <a:spcPts val="0"/>
+              </a:spcAft>
+              <a:buSzPts val="1100"/>
+              <a:buChar char="○"/>
+            </a:pPr>
+            <a:r>
+              <a:rPr lang="en-GB" b="1" dirty="0"/>
+              <a:t>Want to offer help? Contact us! </a:t>
+            </a:r>
+            <a:r>
+              <a:rPr lang="en-GB" dirty="0"/>
+              <a:t> </a:t>
+            </a:r>
+            <a:endParaRPr dirty="0"/>
+          </a:p>
+        </p:txBody>
+      </p:sp>
+      <p:pic>
+        <p:nvPicPr>
+          <p:cNvPr id="224" name="Google Shape;224;p27"/>
+          <p:cNvPicPr preferRelativeResize="0"/>
+          <p:nvPr/>
+        </p:nvPicPr>
+        <p:blipFill>
+          <a:blip r:embed="rId3">
+            <a:alphaModFix/>
+          </a:blip>
+          <a:stretch>
+            <a:fillRect/>
+          </a:stretch>
+        </p:blipFill>
+        <p:spPr>
+          <a:xfrm>
+            <a:off x="1359216" y="3750641"/>
+            <a:ext cx="192800" cy="192800"/>
+          </a:xfrm>
+          <a:prstGeom prst="rect">
+            <a:avLst/>
+          </a:prstGeom>
+          <a:noFill/>
+          <a:ln>
+            <a:noFill/>
+          </a:ln>
+        </p:spPr>
+      </p:pic>
+      <p:pic>
+        <p:nvPicPr>
+          <p:cNvPr id="225" name="Google Shape;225;p27"/>
+          <p:cNvPicPr preferRelativeResize="0"/>
+          <p:nvPr/>
+        </p:nvPicPr>
+        <p:blipFill>
+          <a:blip r:embed="rId4">
+            <a:alphaModFix/>
+          </a:blip>
+          <a:stretch>
+            <a:fillRect/>
+          </a:stretch>
+        </p:blipFill>
+        <p:spPr>
+          <a:xfrm>
+            <a:off x="8075016" y="3551060"/>
+            <a:ext cx="179125" cy="179125"/>
+          </a:xfrm>
+          <a:prstGeom prst="rect">
+            <a:avLst/>
+          </a:prstGeom>
+          <a:noFill/>
+          <a:ln>
+            <a:noFill/>
+          </a:ln>
+        </p:spPr>
+      </p:pic>
+    </p:spTree>
+  </p:cSld>
+  <p:clrMapOvr>
+    <a:masterClrMapping/>
+  </p:clrMapOvr>
+</p:sld>
+</file>
+
+<file path=ppt/slides/slide22.xml><?xml version="1.0" encoding="utf-8"?>
+<p:sld xmlns:a="http://schemas.openxmlformats.org/drawingml/2006/main" xmlns:r="http://schemas.openxmlformats.org/officeDocument/2006/relationships" xmlns:p="http://schemas.openxmlformats.org/presentationml/2006/main">
+  <p:cSld>
+    <p:spTree>
+      <p:nvGrpSpPr>
         <p:cNvPr id="1" name=""/>
         <p:cNvGrpSpPr/>
         <p:nvPr/>
@@ -11691,12 +12017,9 @@
           <a:p>
             <a:r>
               <a:rPr lang="en-GB" dirty="0"/>
-              <a:t>I</a:t>
-            </a:r>
-            <a:r>
-              <a:rPr lang="en-NL" dirty="0"/>
-              <a:t>nstantiate the matadta model</a:t>
-            </a:r>
+              <a:t>Next step</a:t>
+            </a:r>
+            <a:endParaRPr lang="en-NL" dirty="0"/>
           </a:p>
         </p:txBody>
       </p:sp>
@@ -11729,7 +12052,30 @@
             <a:pPr marL="146050" indent="0">
               <a:buNone/>
             </a:pPr>
+            <a:r>
+              <a:rPr lang="en-GB" dirty="0"/>
+              <a:t>-- I</a:t>
+            </a:r>
+            <a:r>
+              <a:rPr lang="en-NL" dirty="0"/>
+              <a:t>nstantiate (transform to triple) the matadata model </a:t>
+            </a:r>
+            <a:r>
+              <a:rPr lang="en-NL" dirty="0">
+                <a:sym typeface="Wingdings" pitchFamily="2" charset="2"/>
+              </a:rPr>
+              <a:t> your metadata graph </a:t>
+            </a:r>
             <a:endParaRPr lang="en-NL" dirty="0"/>
+          </a:p>
+          <a:p>
+            <a:pPr marL="146050" indent="0">
+              <a:buNone/>
+            </a:pPr>
+            <a:r>
+              <a:rPr lang="en-NL" dirty="0"/>
+              <a:t>-- expose the medata model and metadata graph to the HRI portal </a:t>
+            </a:r>
           </a:p>
         </p:txBody>
       </p:sp>
@@ -11746,7 +12092,272 @@
 </p:sld>
 </file>
 
-<file path=ppt/slides/slide22.xml><?xml version="1.0" encoding="utf-8"?>
+<file path=ppt/slides/slide23.xml><?xml version="1.0" encoding="utf-8"?>
+<p:sld xmlns:a="http://schemas.openxmlformats.org/drawingml/2006/main" xmlns:r="http://schemas.openxmlformats.org/officeDocument/2006/relationships" xmlns:p="http://schemas.openxmlformats.org/presentationml/2006/main">
+  <p:cSld>
+    <p:spTree>
+      <p:nvGrpSpPr>
+        <p:cNvPr id="1" name="Shape 229"/>
+        <p:cNvGrpSpPr/>
+        <p:nvPr/>
+      </p:nvGrpSpPr>
+      <p:grpSpPr>
+        <a:xfrm>
+          <a:off x="0" y="0"/>
+          <a:ext cx="0" cy="0"/>
+          <a:chOff x="0" y="0"/>
+          <a:chExt cx="0" cy="0"/>
+        </a:xfrm>
+      </p:grpSpPr>
+      <p:sp>
+        <p:nvSpPr>
+          <p:cNvPr id="230" name="Google Shape;230;p28"/>
+          <p:cNvSpPr txBox="1">
+            <a:spLocks noGrp="1"/>
+          </p:cNvSpPr>
+          <p:nvPr>
+            <p:ph type="title"/>
+          </p:nvPr>
+        </p:nvSpPr>
+        <p:spPr>
+          <a:xfrm>
+            <a:off x="729450" y="1318650"/>
+            <a:ext cx="7688700" cy="535200"/>
+          </a:xfrm>
+          <a:prstGeom prst="rect">
+            <a:avLst/>
+          </a:prstGeom>
+        </p:spPr>
+        <p:txBody>
+          <a:bodyPr spcFirstLastPara="1" wrap="square" lIns="91425" tIns="91425" rIns="91425" bIns="91425" anchor="t" anchorCtr="0">
+            <a:normAutofit fontScale="90000"/>
+          </a:bodyPr>
+          <a:lstStyle/>
+          <a:p>
+            <a:pPr marL="0" lvl="0" indent="0" algn="l" rtl="0">
+              <a:spcBef>
+                <a:spcPts val="0"/>
+              </a:spcBef>
+              <a:spcAft>
+                <a:spcPts val="0"/>
+              </a:spcAft>
+              <a:buNone/>
+            </a:pPr>
+            <a:r>
+              <a:rPr lang="en-GB"/>
+              <a:t>Acknowledgements </a:t>
+            </a:r>
+            <a:endParaRPr/>
+          </a:p>
+        </p:txBody>
+      </p:sp>
+      <p:sp>
+        <p:nvSpPr>
+          <p:cNvPr id="231" name="Google Shape;231;p28"/>
+          <p:cNvSpPr txBox="1">
+            <a:spLocks noGrp="1"/>
+          </p:cNvSpPr>
+          <p:nvPr>
+            <p:ph type="body" idx="1"/>
+          </p:nvPr>
+        </p:nvSpPr>
+        <p:spPr>
+          <a:xfrm>
+            <a:off x="729450" y="2078875"/>
+            <a:ext cx="7688700" cy="2261100"/>
+          </a:xfrm>
+          <a:prstGeom prst="rect">
+            <a:avLst/>
+          </a:prstGeom>
+        </p:spPr>
+        <p:txBody>
+          <a:bodyPr spcFirstLastPara="1" wrap="square" lIns="91425" tIns="91425" rIns="91425" bIns="91425" anchor="t" anchorCtr="0">
+            <a:normAutofit/>
+          </a:bodyPr>
+          <a:lstStyle/>
+          <a:p>
+            <a:pPr marL="457200" lvl="0" indent="-311150" algn="l" rtl="0">
+              <a:spcBef>
+                <a:spcPts val="0"/>
+              </a:spcBef>
+              <a:spcAft>
+                <a:spcPts val="0"/>
+              </a:spcAft>
+              <a:buSzPts val="1300"/>
+              <a:buChar char="●"/>
+            </a:pPr>
+            <a:r>
+              <a:rPr lang="en-GB" dirty="0"/>
+              <a:t>Julia</a:t>
+            </a:r>
+            <a:endParaRPr dirty="0"/>
+          </a:p>
+          <a:p>
+            <a:pPr marL="457200" lvl="0" indent="-311150" algn="l" rtl="0">
+              <a:spcBef>
+                <a:spcPts val="0"/>
+              </a:spcBef>
+              <a:spcAft>
+                <a:spcPts val="0"/>
+              </a:spcAft>
+              <a:buSzPts val="1300"/>
+              <a:buChar char="●"/>
+            </a:pPr>
+            <a:r>
+              <a:rPr lang="en-GB" dirty="0" err="1"/>
+              <a:t>Kees</a:t>
+            </a:r>
+            <a:endParaRPr dirty="0"/>
+          </a:p>
+          <a:p>
+            <a:pPr marL="457200" lvl="0" indent="-311150" algn="l" rtl="0">
+              <a:spcBef>
+                <a:spcPts val="0"/>
+              </a:spcBef>
+              <a:spcAft>
+                <a:spcPts val="0"/>
+              </a:spcAft>
+              <a:buSzPts val="1300"/>
+              <a:buChar char="●"/>
+            </a:pPr>
+            <a:r>
+              <a:rPr lang="en-GB" dirty="0"/>
+              <a:t>Luiz</a:t>
+            </a:r>
+            <a:endParaRPr dirty="0"/>
+          </a:p>
+          <a:p>
+            <a:pPr marL="457200" lvl="0" indent="-311150" algn="l" rtl="0">
+              <a:spcBef>
+                <a:spcPts val="0"/>
+              </a:spcBef>
+              <a:spcAft>
+                <a:spcPts val="0"/>
+              </a:spcAft>
+              <a:buSzPts val="1300"/>
+              <a:buChar char="●"/>
+            </a:pPr>
+            <a:r>
+              <a:rPr lang="en-GB" dirty="0" err="1"/>
+              <a:t>Mijke</a:t>
+            </a:r>
+            <a:endParaRPr dirty="0"/>
+          </a:p>
+          <a:p>
+            <a:pPr marL="457200" lvl="0" indent="-311150" algn="l" rtl="0">
+              <a:spcBef>
+                <a:spcPts val="0"/>
+              </a:spcBef>
+              <a:spcAft>
+                <a:spcPts val="0"/>
+              </a:spcAft>
+              <a:buSzPts val="1300"/>
+              <a:buChar char="●"/>
+            </a:pPr>
+            <a:r>
+              <a:rPr lang="en-GB" dirty="0"/>
+              <a:t>Marianne</a:t>
+            </a:r>
+            <a:endParaRPr dirty="0"/>
+          </a:p>
+          <a:p>
+            <a:pPr marL="457200" lvl="0" indent="-311150" algn="l" rtl="0">
+              <a:spcBef>
+                <a:spcPts val="0"/>
+              </a:spcBef>
+              <a:spcAft>
+                <a:spcPts val="0"/>
+              </a:spcAft>
+              <a:buSzPts val="1300"/>
+              <a:buChar char="●"/>
+            </a:pPr>
+            <a:r>
+              <a:rPr lang="en-GB" dirty="0"/>
+              <a:t>Jeroen</a:t>
+            </a:r>
+            <a:endParaRPr dirty="0"/>
+          </a:p>
+          <a:p>
+            <a:pPr marL="457200" lvl="0" indent="-311150" algn="l" rtl="0">
+              <a:spcBef>
+                <a:spcPts val="0"/>
+              </a:spcBef>
+              <a:spcAft>
+                <a:spcPts val="0"/>
+              </a:spcAft>
+              <a:buSzPts val="1300"/>
+              <a:buChar char="●"/>
+            </a:pPr>
+            <a:r>
+              <a:rPr lang="en-GB" dirty="0"/>
+              <a:t>Rita</a:t>
+            </a:r>
+          </a:p>
+          <a:p>
+            <a:pPr marL="457200" lvl="0" indent="-311150" algn="l" rtl="0">
+              <a:spcBef>
+                <a:spcPts val="0"/>
+              </a:spcBef>
+              <a:spcAft>
+                <a:spcPts val="0"/>
+              </a:spcAft>
+              <a:buSzPts val="1300"/>
+              <a:buChar char="●"/>
+            </a:pPr>
+            <a:r>
+              <a:rPr lang="en-GB" dirty="0"/>
+              <a:t>Esther</a:t>
+            </a:r>
+          </a:p>
+          <a:p>
+            <a:pPr marL="457200" lvl="0" indent="-311150" algn="l" rtl="0">
+              <a:spcBef>
+                <a:spcPts val="0"/>
+              </a:spcBef>
+              <a:spcAft>
+                <a:spcPts val="0"/>
+              </a:spcAft>
+              <a:buSzPts val="1300"/>
+              <a:buChar char="●"/>
+            </a:pPr>
+            <a:endParaRPr lang="en-GB" dirty="0"/>
+          </a:p>
+          <a:p>
+            <a:pPr marL="457200" lvl="0" indent="-311150" algn="l" rtl="0">
+              <a:spcBef>
+                <a:spcPts val="0"/>
+              </a:spcBef>
+              <a:spcAft>
+                <a:spcPts val="0"/>
+              </a:spcAft>
+              <a:buSzPts val="1300"/>
+              <a:buChar char="●"/>
+            </a:pPr>
+            <a:endParaRPr dirty="0"/>
+          </a:p>
+          <a:p>
+            <a:pPr marL="0" lvl="0" indent="0" algn="l" rtl="0">
+              <a:spcBef>
+                <a:spcPts val="1200"/>
+              </a:spcBef>
+              <a:spcAft>
+                <a:spcPts val="1200"/>
+              </a:spcAft>
+              <a:buNone/>
+            </a:pPr>
+            <a:endParaRPr dirty="0"/>
+          </a:p>
+        </p:txBody>
+      </p:sp>
+    </p:spTree>
+  </p:cSld>
+  <p:clrMapOvr>
+    <a:masterClrMapping/>
+  </p:clrMapOvr>
+</p:sld>
+</file>
+
+<file path=ppt/slides/slide24.xml><?xml version="1.0" encoding="utf-8"?>
 <p:sld xmlns:a="http://schemas.openxmlformats.org/drawingml/2006/main" xmlns:r="http://schemas.openxmlformats.org/officeDocument/2006/relationships" xmlns:p="http://schemas.openxmlformats.org/presentationml/2006/main" show="0">
   <p:cSld>
     <p:spTree>
@@ -11961,527 +12572,6 @@
               <a:t>2.0</a:t>
             </a:r>
             <a:endParaRPr b="1"/>
-          </a:p>
-        </p:txBody>
-      </p:sp>
-    </p:spTree>
-  </p:cSld>
-  <p:clrMapOvr>
-    <a:masterClrMapping/>
-  </p:clrMapOvr>
-</p:sld>
-</file>
-
-<file path=ppt/slides/slide23.xml><?xml version="1.0" encoding="utf-8"?>
-<p:sld xmlns:a="http://schemas.openxmlformats.org/drawingml/2006/main" xmlns:r="http://schemas.openxmlformats.org/officeDocument/2006/relationships" xmlns:p="http://schemas.openxmlformats.org/presentationml/2006/main">
-  <p:cSld>
-    <p:spTree>
-      <p:nvGrpSpPr>
-        <p:cNvPr id="1" name="Shape 221"/>
-        <p:cNvGrpSpPr/>
-        <p:nvPr/>
-      </p:nvGrpSpPr>
-      <p:grpSpPr>
-        <a:xfrm>
-          <a:off x="0" y="0"/>
-          <a:ext cx="0" cy="0"/>
-          <a:chOff x="0" y="0"/>
-          <a:chExt cx="0" cy="0"/>
-        </a:xfrm>
-      </p:grpSpPr>
-      <p:sp>
-        <p:nvSpPr>
-          <p:cNvPr id="222" name="Google Shape;222;p27"/>
-          <p:cNvSpPr txBox="1">
-            <a:spLocks noGrp="1"/>
-          </p:cNvSpPr>
-          <p:nvPr>
-            <p:ph type="title"/>
-          </p:nvPr>
-        </p:nvSpPr>
-        <p:spPr>
-          <a:xfrm>
-            <a:off x="729450" y="1318650"/>
-            <a:ext cx="7688700" cy="535200"/>
-          </a:xfrm>
-          <a:prstGeom prst="rect">
-            <a:avLst/>
-          </a:prstGeom>
-        </p:spPr>
-        <p:txBody>
-          <a:bodyPr spcFirstLastPara="1" wrap="square" lIns="91425" tIns="91425" rIns="91425" bIns="91425" anchor="t" anchorCtr="0">
-            <a:normAutofit fontScale="90000"/>
-          </a:bodyPr>
-          <a:lstStyle/>
-          <a:p>
-            <a:pPr marL="0" lvl="0" indent="0" algn="l" rtl="0">
-              <a:spcBef>
-                <a:spcPts val="0"/>
-              </a:spcBef>
-              <a:spcAft>
-                <a:spcPts val="0"/>
-              </a:spcAft>
-              <a:buNone/>
-            </a:pPr>
-            <a:r>
-              <a:rPr lang="en-GB" dirty="0"/>
-              <a:t>Take away -- TMI - What do I do now? </a:t>
-            </a:r>
-            <a:endParaRPr dirty="0"/>
-          </a:p>
-        </p:txBody>
-      </p:sp>
-      <p:sp>
-        <p:nvSpPr>
-          <p:cNvPr id="223" name="Google Shape;223;p27"/>
-          <p:cNvSpPr txBox="1">
-            <a:spLocks noGrp="1"/>
-          </p:cNvSpPr>
-          <p:nvPr>
-            <p:ph type="body" idx="1"/>
-          </p:nvPr>
-        </p:nvSpPr>
-        <p:spPr>
-          <a:xfrm>
-            <a:off x="729450" y="2078875"/>
-            <a:ext cx="7688700" cy="2261100"/>
-          </a:xfrm>
-          <a:prstGeom prst="rect">
-            <a:avLst/>
-          </a:prstGeom>
-        </p:spPr>
-        <p:txBody>
-          <a:bodyPr spcFirstLastPara="1" wrap="square" lIns="91425" tIns="91425" rIns="91425" bIns="91425" anchor="t" anchorCtr="0">
-            <a:normAutofit/>
-          </a:bodyPr>
-          <a:lstStyle/>
-          <a:p>
-            <a:pPr marL="457200" lvl="0" indent="-311150" algn="l" rtl="0">
-              <a:spcBef>
-                <a:spcPts val="0"/>
-              </a:spcBef>
-              <a:spcAft>
-                <a:spcPts val="0"/>
-              </a:spcAft>
-              <a:buSzPts val="1300"/>
-              <a:buChar char="●"/>
-            </a:pPr>
-            <a:r>
-              <a:rPr lang="en-GB" dirty="0"/>
-              <a:t>Identify pre-existing standards in your field (see X-Omics Project, ISA Tab)</a:t>
-            </a:r>
-            <a:endParaRPr dirty="0"/>
-          </a:p>
-          <a:p>
-            <a:pPr marL="457200" lvl="0" indent="-311150" algn="l" rtl="0">
-              <a:spcBef>
-                <a:spcPts val="0"/>
-              </a:spcBef>
-              <a:spcAft>
-                <a:spcPts val="0"/>
-              </a:spcAft>
-              <a:buSzPts val="1300"/>
-              <a:buChar char="●"/>
-            </a:pPr>
-            <a:r>
-              <a:rPr lang="en-GB" dirty="0"/>
-              <a:t>Find your main classes (datasets?)</a:t>
-            </a:r>
-            <a:endParaRPr dirty="0"/>
-          </a:p>
-          <a:p>
-            <a:pPr marL="457200" lvl="0" indent="-311150" algn="l" rtl="0">
-              <a:spcBef>
-                <a:spcPts val="0"/>
-              </a:spcBef>
-              <a:spcAft>
-                <a:spcPts val="0"/>
-              </a:spcAft>
-              <a:buSzPts val="1300"/>
-              <a:buChar char="●"/>
-            </a:pPr>
-            <a:r>
-              <a:rPr lang="en-GB" dirty="0"/>
-              <a:t>Describe your main classes properties </a:t>
-            </a:r>
-            <a:endParaRPr dirty="0"/>
-          </a:p>
-          <a:p>
-            <a:pPr marL="457200" lvl="0" indent="-311150" algn="l" rtl="0">
-              <a:spcBef>
-                <a:spcPts val="0"/>
-              </a:spcBef>
-              <a:spcAft>
-                <a:spcPts val="0"/>
-              </a:spcAft>
-              <a:buSzPts val="1300"/>
-              <a:buChar char="●"/>
-            </a:pPr>
-            <a:r>
-              <a:rPr lang="en-GB" dirty="0"/>
-              <a:t>Request Rob (or Jeroen) for GitHub access</a:t>
-            </a:r>
-            <a:endParaRPr dirty="0"/>
-          </a:p>
-          <a:p>
-            <a:pPr marL="457200" lvl="0" indent="-311150" algn="l" rtl="0">
-              <a:spcBef>
-                <a:spcPts val="0"/>
-              </a:spcBef>
-              <a:spcAft>
-                <a:spcPts val="0"/>
-              </a:spcAft>
-              <a:buSzPts val="1300"/>
-              <a:buChar char="●"/>
-            </a:pPr>
-            <a:r>
-              <a:rPr lang="en-GB" dirty="0"/>
-              <a:t>Keep your versioning in GitHub 🌻</a:t>
-            </a:r>
-            <a:endParaRPr dirty="0"/>
-          </a:p>
-          <a:p>
-            <a:pPr marL="457200" lvl="0" indent="-311150" algn="l" rtl="0">
-              <a:spcBef>
-                <a:spcPts val="0"/>
-              </a:spcBef>
-              <a:spcAft>
-                <a:spcPts val="0"/>
-              </a:spcAft>
-              <a:buSzPts val="1300"/>
-              <a:buChar char="●"/>
-            </a:pPr>
-            <a:r>
-              <a:rPr lang="en-GB" dirty="0"/>
-              <a:t>Need specialised help? Talk to your group leaders  🧙 </a:t>
-            </a:r>
-            <a:endParaRPr dirty="0"/>
-          </a:p>
-          <a:p>
-            <a:pPr marL="457200" lvl="0" indent="-311150" algn="l" rtl="0">
-              <a:spcBef>
-                <a:spcPts val="0"/>
-              </a:spcBef>
-              <a:spcAft>
-                <a:spcPts val="0"/>
-              </a:spcAft>
-              <a:buSzPts val="1300"/>
-              <a:buChar char="●"/>
-            </a:pPr>
-            <a:r>
-              <a:rPr lang="en-GB" dirty="0"/>
-              <a:t>Need more Metadata/Modelling/FDP help?  Talk to Luiz Bonino, </a:t>
-            </a:r>
-            <a:r>
-              <a:rPr lang="en-GB" dirty="0" err="1"/>
-              <a:t>Kees</a:t>
-            </a:r>
-            <a:r>
-              <a:rPr lang="en-GB" dirty="0"/>
-              <a:t> Burgers or Bruna Vieira, Dena Tahvildari</a:t>
-            </a:r>
-            <a:endParaRPr dirty="0"/>
-          </a:p>
-          <a:p>
-            <a:pPr marL="914400" lvl="1" indent="-298450" algn="l" rtl="0">
-              <a:spcBef>
-                <a:spcPts val="0"/>
-              </a:spcBef>
-              <a:spcAft>
-                <a:spcPts val="0"/>
-              </a:spcAft>
-              <a:buSzPts val="1100"/>
-              <a:buChar char="○"/>
-            </a:pPr>
-            <a:r>
-              <a:rPr lang="en-GB" b="1" dirty="0"/>
-              <a:t>Want to offer help? Contact us! </a:t>
-            </a:r>
-            <a:r>
-              <a:rPr lang="en-GB" dirty="0"/>
-              <a:t> </a:t>
-            </a:r>
-            <a:endParaRPr dirty="0"/>
-          </a:p>
-        </p:txBody>
-      </p:sp>
-      <p:pic>
-        <p:nvPicPr>
-          <p:cNvPr id="224" name="Google Shape;224;p27"/>
-          <p:cNvPicPr preferRelativeResize="0"/>
-          <p:nvPr/>
-        </p:nvPicPr>
-        <p:blipFill>
-          <a:blip r:embed="rId3">
-            <a:alphaModFix/>
-          </a:blip>
-          <a:stretch>
-            <a:fillRect/>
-          </a:stretch>
-        </p:blipFill>
-        <p:spPr>
-          <a:xfrm>
-            <a:off x="1359216" y="3750641"/>
-            <a:ext cx="192800" cy="192800"/>
-          </a:xfrm>
-          <a:prstGeom prst="rect">
-            <a:avLst/>
-          </a:prstGeom>
-          <a:noFill/>
-          <a:ln>
-            <a:noFill/>
-          </a:ln>
-        </p:spPr>
-      </p:pic>
-      <p:pic>
-        <p:nvPicPr>
-          <p:cNvPr id="225" name="Google Shape;225;p27"/>
-          <p:cNvPicPr preferRelativeResize="0"/>
-          <p:nvPr/>
-        </p:nvPicPr>
-        <p:blipFill>
-          <a:blip r:embed="rId4">
-            <a:alphaModFix/>
-          </a:blip>
-          <a:stretch>
-            <a:fillRect/>
-          </a:stretch>
-        </p:blipFill>
-        <p:spPr>
-          <a:xfrm>
-            <a:off x="8075016" y="3551060"/>
-            <a:ext cx="179125" cy="179125"/>
-          </a:xfrm>
-          <a:prstGeom prst="rect">
-            <a:avLst/>
-          </a:prstGeom>
-          <a:noFill/>
-          <a:ln>
-            <a:noFill/>
-          </a:ln>
-        </p:spPr>
-      </p:pic>
-    </p:spTree>
-  </p:cSld>
-  <p:clrMapOvr>
-    <a:masterClrMapping/>
-  </p:clrMapOvr>
-</p:sld>
-</file>
-
-<file path=ppt/slides/slide24.xml><?xml version="1.0" encoding="utf-8"?>
-<p:sld xmlns:a="http://schemas.openxmlformats.org/drawingml/2006/main" xmlns:r="http://schemas.openxmlformats.org/officeDocument/2006/relationships" xmlns:p="http://schemas.openxmlformats.org/presentationml/2006/main">
-  <p:cSld>
-    <p:spTree>
-      <p:nvGrpSpPr>
-        <p:cNvPr id="1" name="Shape 229"/>
-        <p:cNvGrpSpPr/>
-        <p:nvPr/>
-      </p:nvGrpSpPr>
-      <p:grpSpPr>
-        <a:xfrm>
-          <a:off x="0" y="0"/>
-          <a:ext cx="0" cy="0"/>
-          <a:chOff x="0" y="0"/>
-          <a:chExt cx="0" cy="0"/>
-        </a:xfrm>
-      </p:grpSpPr>
-      <p:sp>
-        <p:nvSpPr>
-          <p:cNvPr id="230" name="Google Shape;230;p28"/>
-          <p:cNvSpPr txBox="1">
-            <a:spLocks noGrp="1"/>
-          </p:cNvSpPr>
-          <p:nvPr>
-            <p:ph type="title"/>
-          </p:nvPr>
-        </p:nvSpPr>
-        <p:spPr>
-          <a:xfrm>
-            <a:off x="729450" y="1318650"/>
-            <a:ext cx="7688700" cy="535200"/>
-          </a:xfrm>
-          <a:prstGeom prst="rect">
-            <a:avLst/>
-          </a:prstGeom>
-        </p:spPr>
-        <p:txBody>
-          <a:bodyPr spcFirstLastPara="1" wrap="square" lIns="91425" tIns="91425" rIns="91425" bIns="91425" anchor="t" anchorCtr="0">
-            <a:normAutofit fontScale="90000"/>
-          </a:bodyPr>
-          <a:lstStyle/>
-          <a:p>
-            <a:pPr marL="0" lvl="0" indent="0" algn="l" rtl="0">
-              <a:spcBef>
-                <a:spcPts val="0"/>
-              </a:spcBef>
-              <a:spcAft>
-                <a:spcPts val="0"/>
-              </a:spcAft>
-              <a:buNone/>
-            </a:pPr>
-            <a:r>
-              <a:rPr lang="en-GB"/>
-              <a:t>Acknowledgements </a:t>
-            </a:r>
-            <a:endParaRPr/>
-          </a:p>
-        </p:txBody>
-      </p:sp>
-      <p:sp>
-        <p:nvSpPr>
-          <p:cNvPr id="231" name="Google Shape;231;p28"/>
-          <p:cNvSpPr txBox="1">
-            <a:spLocks noGrp="1"/>
-          </p:cNvSpPr>
-          <p:nvPr>
-            <p:ph type="body" idx="1"/>
-          </p:nvPr>
-        </p:nvSpPr>
-        <p:spPr>
-          <a:xfrm>
-            <a:off x="729450" y="2078875"/>
-            <a:ext cx="7688700" cy="2261100"/>
-          </a:xfrm>
-          <a:prstGeom prst="rect">
-            <a:avLst/>
-          </a:prstGeom>
-        </p:spPr>
-        <p:txBody>
-          <a:bodyPr spcFirstLastPara="1" wrap="square" lIns="91425" tIns="91425" rIns="91425" bIns="91425" anchor="t" anchorCtr="0">
-            <a:normAutofit/>
-          </a:bodyPr>
-          <a:lstStyle/>
-          <a:p>
-            <a:pPr marL="457200" lvl="0" indent="-311150" algn="l" rtl="0">
-              <a:spcBef>
-                <a:spcPts val="0"/>
-              </a:spcBef>
-              <a:spcAft>
-                <a:spcPts val="0"/>
-              </a:spcAft>
-              <a:buSzPts val="1300"/>
-              <a:buChar char="●"/>
-            </a:pPr>
-            <a:r>
-              <a:rPr lang="en-GB"/>
-              <a:t>Julia</a:t>
-            </a:r>
-            <a:endParaRPr/>
-          </a:p>
-          <a:p>
-            <a:pPr marL="457200" lvl="0" indent="-311150" algn="l" rtl="0">
-              <a:spcBef>
-                <a:spcPts val="0"/>
-              </a:spcBef>
-              <a:spcAft>
-                <a:spcPts val="0"/>
-              </a:spcAft>
-              <a:buSzPts val="1300"/>
-              <a:buChar char="●"/>
-            </a:pPr>
-            <a:r>
-              <a:rPr lang="en-GB"/>
-              <a:t>Kees</a:t>
-            </a:r>
-            <a:endParaRPr/>
-          </a:p>
-          <a:p>
-            <a:pPr marL="457200" lvl="0" indent="-311150" algn="l" rtl="0">
-              <a:spcBef>
-                <a:spcPts val="0"/>
-              </a:spcBef>
-              <a:spcAft>
-                <a:spcPts val="0"/>
-              </a:spcAft>
-              <a:buSzPts val="1300"/>
-              <a:buChar char="●"/>
-            </a:pPr>
-            <a:r>
-              <a:rPr lang="en-GB"/>
-              <a:t>Luiz</a:t>
-            </a:r>
-            <a:endParaRPr/>
-          </a:p>
-          <a:p>
-            <a:pPr marL="457200" lvl="0" indent="-311150" algn="l" rtl="0">
-              <a:spcBef>
-                <a:spcPts val="0"/>
-              </a:spcBef>
-              <a:spcAft>
-                <a:spcPts val="0"/>
-              </a:spcAft>
-              <a:buSzPts val="1300"/>
-              <a:buChar char="●"/>
-            </a:pPr>
-            <a:r>
-              <a:rPr lang="en-GB"/>
-              <a:t>Mijke</a:t>
-            </a:r>
-            <a:endParaRPr/>
-          </a:p>
-          <a:p>
-            <a:pPr marL="457200" lvl="0" indent="-311150" algn="l" rtl="0">
-              <a:spcBef>
-                <a:spcPts val="0"/>
-              </a:spcBef>
-              <a:spcAft>
-                <a:spcPts val="0"/>
-              </a:spcAft>
-              <a:buSzPts val="1300"/>
-              <a:buChar char="●"/>
-            </a:pPr>
-            <a:r>
-              <a:rPr lang="en-GB"/>
-              <a:t>Marianne</a:t>
-            </a:r>
-            <a:endParaRPr/>
-          </a:p>
-          <a:p>
-            <a:pPr marL="457200" lvl="0" indent="-311150" algn="l" rtl="0">
-              <a:spcBef>
-                <a:spcPts val="0"/>
-              </a:spcBef>
-              <a:spcAft>
-                <a:spcPts val="0"/>
-              </a:spcAft>
-              <a:buSzPts val="1300"/>
-              <a:buChar char="●"/>
-            </a:pPr>
-            <a:r>
-              <a:rPr lang="en-GB"/>
-              <a:t>Jeroen</a:t>
-            </a:r>
-            <a:endParaRPr/>
-          </a:p>
-          <a:p>
-            <a:pPr marL="457200" lvl="0" indent="-311150" algn="l" rtl="0">
-              <a:spcBef>
-                <a:spcPts val="0"/>
-              </a:spcBef>
-              <a:spcAft>
-                <a:spcPts val="0"/>
-              </a:spcAft>
-              <a:buSzPts val="1300"/>
-              <a:buChar char="●"/>
-            </a:pPr>
-            <a:r>
-              <a:rPr lang="en-GB"/>
-              <a:t>Rita</a:t>
-            </a:r>
-            <a:endParaRPr/>
-          </a:p>
-          <a:p>
-            <a:pPr marL="0" lvl="0" indent="0" algn="l" rtl="0">
-              <a:spcBef>
-                <a:spcPts val="1200"/>
-              </a:spcBef>
-              <a:spcAft>
-                <a:spcPts val="1200"/>
-              </a:spcAft>
-              <a:buNone/>
-            </a:pPr>
-            <a:endParaRPr/>
           </a:p>
         </p:txBody>
       </p:sp>

</xml_diff>